<commit_message>
Added some comments and fixed a typo in the ER_Diagram.drawio.pdf file.
</commit_message>
<xml_diff>
--- a/deliverables/TelcoDBpptxDeliverable.pptx
+++ b/deliverables/TelcoDBpptxDeliverable.pptx
@@ -281,7 +281,7 @@
           <a:p>
             <a:fld id="{AD72A4D6-BD0D-0949-A16B-49DD687144CB}" type="datetimeFigureOut">
               <a:rPr lang="it-IT" smtClean="0"/>
-              <a:t>11/05/22</a:t>
+              <a:t>30/05/22</a:t>
             </a:fld>
             <a:endParaRPr lang="it-IT"/>
           </a:p>
@@ -763,7 +763,7 @@
           <a:p>
             <a:fld id="{897C5FF5-7ED2-C441-9911-12A7A12BA03E}" type="datetimeFigureOut">
               <a:rPr lang="it-IT" smtClean="0"/>
-              <a:t>11/05/22</a:t>
+              <a:t>30/05/22</a:t>
             </a:fld>
             <a:endParaRPr lang="it-IT"/>
           </a:p>
@@ -933,7 +933,7 @@
           <a:p>
             <a:fld id="{897C5FF5-7ED2-C441-9911-12A7A12BA03E}" type="datetimeFigureOut">
               <a:rPr lang="it-IT" smtClean="0"/>
-              <a:t>11/05/22</a:t>
+              <a:t>30/05/22</a:t>
             </a:fld>
             <a:endParaRPr lang="it-IT"/>
           </a:p>
@@ -1113,7 +1113,7 @@
           <a:p>
             <a:fld id="{897C5FF5-7ED2-C441-9911-12A7A12BA03E}" type="datetimeFigureOut">
               <a:rPr lang="it-IT" smtClean="0"/>
-              <a:t>11/05/22</a:t>
+              <a:t>30/05/22</a:t>
             </a:fld>
             <a:endParaRPr lang="it-IT"/>
           </a:p>
@@ -1283,7 +1283,7 @@
           <a:p>
             <a:fld id="{897C5FF5-7ED2-C441-9911-12A7A12BA03E}" type="datetimeFigureOut">
               <a:rPr lang="it-IT" smtClean="0"/>
-              <a:t>11/05/22</a:t>
+              <a:t>30/05/22</a:t>
             </a:fld>
             <a:endParaRPr lang="it-IT"/>
           </a:p>
@@ -1527,7 +1527,7 @@
           <a:p>
             <a:fld id="{897C5FF5-7ED2-C441-9911-12A7A12BA03E}" type="datetimeFigureOut">
               <a:rPr lang="it-IT" smtClean="0"/>
-              <a:t>11/05/22</a:t>
+              <a:t>30/05/22</a:t>
             </a:fld>
             <a:endParaRPr lang="it-IT"/>
           </a:p>
@@ -1759,7 +1759,7 @@
           <a:p>
             <a:fld id="{897C5FF5-7ED2-C441-9911-12A7A12BA03E}" type="datetimeFigureOut">
               <a:rPr lang="it-IT" smtClean="0"/>
-              <a:t>11/05/22</a:t>
+              <a:t>30/05/22</a:t>
             </a:fld>
             <a:endParaRPr lang="it-IT"/>
           </a:p>
@@ -2126,7 +2126,7 @@
           <a:p>
             <a:fld id="{897C5FF5-7ED2-C441-9911-12A7A12BA03E}" type="datetimeFigureOut">
               <a:rPr lang="it-IT" smtClean="0"/>
-              <a:t>11/05/22</a:t>
+              <a:t>30/05/22</a:t>
             </a:fld>
             <a:endParaRPr lang="it-IT"/>
           </a:p>
@@ -2244,7 +2244,7 @@
           <a:p>
             <a:fld id="{897C5FF5-7ED2-C441-9911-12A7A12BA03E}" type="datetimeFigureOut">
               <a:rPr lang="it-IT" smtClean="0"/>
-              <a:t>11/05/22</a:t>
+              <a:t>30/05/22</a:t>
             </a:fld>
             <a:endParaRPr lang="it-IT"/>
           </a:p>
@@ -2339,7 +2339,7 @@
           <a:p>
             <a:fld id="{897C5FF5-7ED2-C441-9911-12A7A12BA03E}" type="datetimeFigureOut">
               <a:rPr lang="it-IT" smtClean="0"/>
-              <a:t>11/05/22</a:t>
+              <a:t>30/05/22</a:t>
             </a:fld>
             <a:endParaRPr lang="it-IT"/>
           </a:p>
@@ -2616,7 +2616,7 @@
           <a:p>
             <a:fld id="{897C5FF5-7ED2-C441-9911-12A7A12BA03E}" type="datetimeFigureOut">
               <a:rPr lang="it-IT" smtClean="0"/>
-              <a:t>11/05/22</a:t>
+              <a:t>30/05/22</a:t>
             </a:fld>
             <a:endParaRPr lang="it-IT"/>
           </a:p>
@@ -2873,7 +2873,7 @@
           <a:p>
             <a:fld id="{897C5FF5-7ED2-C441-9911-12A7A12BA03E}" type="datetimeFigureOut">
               <a:rPr lang="it-IT" smtClean="0"/>
-              <a:t>11/05/22</a:t>
+              <a:t>30/05/22</a:t>
             </a:fld>
             <a:endParaRPr lang="it-IT"/>
           </a:p>
@@ -3086,7 +3086,7 @@
           <a:p>
             <a:fld id="{897C5FF5-7ED2-C441-9911-12A7A12BA03E}" type="datetimeFigureOut">
               <a:rPr lang="it-IT" smtClean="0"/>
-              <a:t>11/05/22</a:t>
+              <a:t>30/05/22</a:t>
             </a:fld>
             <a:endParaRPr lang="it-IT"/>
           </a:p>
@@ -34168,10 +34168,10 @@
       </p:grpSpPr>
       <p:pic>
         <p:nvPicPr>
-          <p:cNvPr id="3" name="Elemento grafico 2">
+          <p:cNvPr id="4" name="Elemento grafico 3">
             <a:extLst>
               <a:ext uri="{FF2B5EF4-FFF2-40B4-BE49-F238E27FC236}">
-                <a16:creationId xmlns:a16="http://schemas.microsoft.com/office/drawing/2014/main" id="{B8ED6363-3DB5-714D-BDE8-9A042BDE8E8E}"/>
+                <a16:creationId xmlns:a16="http://schemas.microsoft.com/office/drawing/2014/main" id="{2396315C-6FF6-1FFC-D74C-673253C646C7}"/>
               </a:ext>
             </a:extLst>
           </p:cNvPr>
@@ -34194,8 +34194,8 @@
         </p:blipFill>
         <p:spPr>
           <a:xfrm>
-            <a:off x="151140" y="0"/>
-            <a:ext cx="8841719" cy="6858000"/>
+            <a:off x="246523" y="73983"/>
+            <a:ext cx="8650953" cy="6710034"/>
           </a:xfrm>
           <a:prstGeom prst="rect">
             <a:avLst/>

</xml_diff>